<commit_message>
a few minor tweaks
</commit_message>
<xml_diff>
--- a/java_operations/Lopsa Columbus - Operations view of the Java VM.pptx
+++ b/java_operations/Lopsa Columbus - Operations view of the Java VM.pptx
@@ -210,7 +210,7 @@
           <a:p>
             <a:fld id="{5B57975D-8600-6C44-8C2E-53A962C757AC}" type="datetimeFigureOut">
               <a:rPr lang="en-US" smtClean="0"/>
-              <a:t>5/25/15</a:t>
+              <a:t>5/26/15</a:t>
             </a:fld>
             <a:endParaRPr lang="en-US" dirty="0"/>
           </a:p>
@@ -612,6 +612,104 @@
           <a:p>
             <a:r>
               <a:rPr lang="en-US" dirty="0" smtClean="0"/>
+              <a:t>Example of a jmx view for over-all</a:t>
+            </a:r>
+            <a:r>
+              <a:rPr lang="en-US" baseline="0" dirty="0" smtClean="0"/>
+              <a:t> java heap usage. Note this is a table/composite data type. In this case, the value column is in bytes</a:t>
+            </a:r>
+          </a:p>
+          <a:p>
+            <a:r>
+              <a:rPr lang="en-US" baseline="0" dirty="0" smtClean="0"/>
+              <a:t>Also note we verbose is false. We could change that to true, just click it and probably select a drop-down of values</a:t>
+            </a:r>
+            <a:endParaRPr lang="en-US" dirty="0"/>
+          </a:p>
+        </p:txBody>
+      </p:sp>
+      <p:sp>
+        <p:nvSpPr>
+          <p:cNvPr id="4" name="Slide Number Placeholder 3"/>
+          <p:cNvSpPr>
+            <a:spLocks noGrp="1"/>
+          </p:cNvSpPr>
+          <p:nvPr>
+            <p:ph type="sldNum" sz="quarter" idx="10"/>
+          </p:nvPr>
+        </p:nvSpPr>
+        <p:spPr/>
+        <p:txBody>
+          <a:bodyPr/>
+          <a:lstStyle/>
+          <a:p>
+            <a:fld id="{F393B308-0126-7843-99E1-3134E661C2A1}" type="slidenum">
+              <a:rPr lang="en-US" smtClean="0"/>
+              <a:t>16</a:t>
+            </a:fld>
+            <a:endParaRPr lang="en-US" dirty="0"/>
+          </a:p>
+        </p:txBody>
+      </p:sp>
+    </p:spTree>
+    <p:extLst>
+      <p:ext uri="{BB962C8B-B14F-4D97-AF65-F5344CB8AC3E}">
+        <p14:creationId xmlns:p14="http://schemas.microsoft.com/office/powerpoint/2010/main" val="1041207117"/>
+      </p:ext>
+    </p:extLst>
+  </p:cSld>
+  <p:clrMapOvr>
+    <a:masterClrMapping/>
+  </p:clrMapOvr>
+</p:notes>
+</file>
+
+<file path=ppt/notesSlides/notesSlide11.xml><?xml version="1.0" encoding="utf-8"?>
+<p:notes xmlns:a="http://schemas.openxmlformats.org/drawingml/2006/main" xmlns:r="http://schemas.openxmlformats.org/officeDocument/2006/relationships" xmlns:p="http://schemas.openxmlformats.org/presentationml/2006/main">
+  <p:cSld>
+    <p:spTree>
+      <p:nvGrpSpPr>
+        <p:cNvPr id="1" name=""/>
+        <p:cNvGrpSpPr/>
+        <p:nvPr/>
+      </p:nvGrpSpPr>
+      <p:grpSpPr>
+        <a:xfrm>
+          <a:off x="0" y="0"/>
+          <a:ext cx="0" cy="0"/>
+          <a:chOff x="0" y="0"/>
+          <a:chExt cx="0" cy="0"/>
+        </a:xfrm>
+      </p:grpSpPr>
+      <p:sp>
+        <p:nvSpPr>
+          <p:cNvPr id="2" name="Slide Image Placeholder 1"/>
+          <p:cNvSpPr>
+            <a:spLocks noGrp="1" noRot="1" noChangeAspect="1"/>
+          </p:cNvSpPr>
+          <p:nvPr>
+            <p:ph type="sldImg"/>
+          </p:nvPr>
+        </p:nvSpPr>
+        <p:spPr/>
+      </p:sp>
+      <p:sp>
+        <p:nvSpPr>
+          <p:cNvPr id="3" name="Notes Placeholder 2"/>
+          <p:cNvSpPr>
+            <a:spLocks noGrp="1"/>
+          </p:cNvSpPr>
+          <p:nvPr>
+            <p:ph type="body" idx="1"/>
+          </p:nvPr>
+        </p:nvSpPr>
+        <p:spPr/>
+        <p:txBody>
+          <a:bodyPr/>
+          <a:lstStyle/>
+          <a:p>
+            <a:r>
+              <a:rPr lang="en-US" dirty="0" smtClean="0"/>
               <a:t>Deeper view of the metadata for the memory</a:t>
             </a:r>
           </a:p>
@@ -1203,40 +1301,36 @@
           <a:p>
             <a:r>
               <a:rPr lang="en-US" dirty="0" smtClean="0"/>
-              <a:t>Standard garbage collector in java 1.7. only</a:t>
-            </a:r>
-            <a:r>
-              <a:rPr lang="en-US" baseline="0" dirty="0" smtClean="0"/>
-              <a:t> tweak here is the max heap</a:t>
-            </a:r>
-          </a:p>
-          <a:p>
-            <a:r>
-              <a:rPr lang="en-US" baseline="0" dirty="0" smtClean="0"/>
-              <a:t>Note the difference in the values. Eden max is 2.666gb but only allocated 64.5 meg</a:t>
-            </a:r>
-          </a:p>
-          <a:p>
-            <a:r>
-              <a:rPr lang="en-US" baseline="0" dirty="0" smtClean="0"/>
-              <a:t>Also note the “saw tooth” behavior, that</a:t>
-            </a:r>
-            <a:r>
-              <a:rPr lang="fr-FR" baseline="0" dirty="0" smtClean="0"/>
-              <a:t>’</a:t>
-            </a:r>
-            <a:r>
-              <a:rPr lang="en-US" baseline="0" dirty="0" smtClean="0"/>
-              <a:t>s actually what you are looking for </a:t>
-            </a:r>
-          </a:p>
-          <a:p>
-            <a:r>
-              <a:rPr lang="en-US" baseline="0" dirty="0" smtClean="0"/>
-              <a:t>sign of slow/steady growth. A bunch of objects are created and only a small percentage are promoted to survivor and then to old gen</a:t>
-            </a:r>
-          </a:p>
-          <a:p>
+              <a:t>http://</a:t>
+            </a:r>
+            <a:r>
+              <a:rPr lang="en-US" dirty="0" err="1" smtClean="0"/>
+              <a:t>docs.oracle.com</a:t>
+            </a:r>
+            <a:r>
+              <a:rPr lang="en-US" dirty="0" smtClean="0"/>
+              <a:t>/</a:t>
+            </a:r>
+            <a:r>
+              <a:rPr lang="en-US" dirty="0" err="1" smtClean="0"/>
+              <a:t>javase</a:t>
+            </a:r>
+            <a:r>
+              <a:rPr lang="en-US" dirty="0" smtClean="0"/>
+              <a:t>/6/docs/</a:t>
+            </a:r>
+            <a:r>
+              <a:rPr lang="en-US" dirty="0" err="1" smtClean="0"/>
+              <a:t>technotes</a:t>
+            </a:r>
+            <a:r>
+              <a:rPr lang="en-US" dirty="0" smtClean="0"/>
+              <a:t>/tools/share/</a:t>
+            </a:r>
+            <a:r>
+              <a:rPr lang="en-US" dirty="0" err="1" smtClean="0"/>
+              <a:t>jstat.html#output_options</a:t>
+            </a:r>
             <a:endParaRPr lang="en-US" dirty="0"/>
           </a:p>
         </p:txBody>
@@ -1258,7 +1352,7 @@
           <a:p>
             <a:fld id="{F393B308-0126-7843-99E1-3134E661C2A1}" type="slidenum">
               <a:rPr lang="en-US" smtClean="0"/>
-              <a:t>13</a:t>
+              <a:t>12</a:t>
             </a:fld>
             <a:endParaRPr lang="en-US" dirty="0"/>
           </a:p>
@@ -1267,7 +1361,7 @@
     </p:spTree>
     <p:extLst>
       <p:ext uri="{BB962C8B-B14F-4D97-AF65-F5344CB8AC3E}">
-        <p14:creationId xmlns:p14="http://schemas.microsoft.com/office/powerpoint/2010/main" val="1274605641"/>
+        <p14:creationId xmlns:p14="http://schemas.microsoft.com/office/powerpoint/2010/main" val="1449149538"/>
       </p:ext>
     </p:extLst>
   </p:cSld>
@@ -1323,27 +1417,40 @@
           <a:p>
             <a:r>
               <a:rPr lang="en-US" dirty="0" smtClean="0"/>
-              <a:t>Main difference here is the G1 garbage collector</a:t>
+              <a:t>Standard garbage collector in java 1.7. only</a:t>
             </a:r>
             <a:r>
               <a:rPr lang="en-US" baseline="0" dirty="0" smtClean="0"/>
-              <a:t> being turned on</a:t>
+              <a:t> tweak here is the max heap</a:t>
             </a:r>
           </a:p>
           <a:p>
             <a:r>
               <a:rPr lang="en-US" baseline="0" dirty="0" smtClean="0"/>
-              <a:t>Note that old gen does grow without lots of churn in the eden/survivors</a:t>
-            </a:r>
-          </a:p>
-          <a:p>
-            <a:endParaRPr lang="en-US" baseline="0" dirty="0" smtClean="0"/>
-          </a:p>
-          <a:p>
-            <a:r>
-              <a:rPr lang="en-US" dirty="0" smtClean="0"/>
-              <a:t>-XX:+UseG1GC</a:t>
-            </a:r>
+              <a:t>Note the difference in the values. Eden max is 2.666gb but only allocated 64.5 meg</a:t>
+            </a:r>
+          </a:p>
+          <a:p>
+            <a:r>
+              <a:rPr lang="en-US" baseline="0" dirty="0" smtClean="0"/>
+              <a:t>Also note the “saw tooth” behavior, that</a:t>
+            </a:r>
+            <a:r>
+              <a:rPr lang="fr-FR" baseline="0" dirty="0" smtClean="0"/>
+              <a:t>’</a:t>
+            </a:r>
+            <a:r>
+              <a:rPr lang="en-US" baseline="0" dirty="0" smtClean="0"/>
+              <a:t>s actually what you are looking for </a:t>
+            </a:r>
+          </a:p>
+          <a:p>
+            <a:r>
+              <a:rPr lang="en-US" baseline="0" dirty="0" smtClean="0"/>
+              <a:t>sign of slow/steady growth. A bunch of objects are created and only a small percentage are promoted to survivor and then to old gen</a:t>
+            </a:r>
+          </a:p>
+          <a:p>
             <a:endParaRPr lang="en-US" dirty="0"/>
           </a:p>
         </p:txBody>
@@ -1365,7 +1472,7 @@
           <a:p>
             <a:fld id="{F393B308-0126-7843-99E1-3134E661C2A1}" type="slidenum">
               <a:rPr lang="en-US" smtClean="0"/>
-              <a:t>14</a:t>
+              <a:t>13</a:t>
             </a:fld>
             <a:endParaRPr lang="en-US" dirty="0"/>
           </a:p>
@@ -1374,7 +1481,7 @@
     </p:spTree>
     <p:extLst>
       <p:ext uri="{BB962C8B-B14F-4D97-AF65-F5344CB8AC3E}">
-        <p14:creationId xmlns:p14="http://schemas.microsoft.com/office/powerpoint/2010/main" val="87363976"/>
+        <p14:creationId xmlns:p14="http://schemas.microsoft.com/office/powerpoint/2010/main" val="1274605641"/>
       </p:ext>
     </p:extLst>
   </p:cSld>
@@ -1430,17 +1537,26 @@
           <a:p>
             <a:r>
               <a:rPr lang="en-US" dirty="0" smtClean="0"/>
-              <a:t>Example of a jmx view for over-all</a:t>
+              <a:t>Main difference here is the G1 garbage collector</a:t>
             </a:r>
             <a:r>
               <a:rPr lang="en-US" baseline="0" dirty="0" smtClean="0"/>
-              <a:t> java heap usage. Note this is a table/composite data type. In this case, the value column is in bytes</a:t>
+              <a:t> being turned on</a:t>
             </a:r>
           </a:p>
           <a:p>
             <a:r>
               <a:rPr lang="en-US" baseline="0" dirty="0" smtClean="0"/>
-              <a:t>Also note we verbose is false. We could change that to true, just click it and probably select a drop-down of values</a:t>
+              <a:t>Note that old gen does grow without lots of churn in the eden/survivors</a:t>
+            </a:r>
+          </a:p>
+          <a:p>
+            <a:endParaRPr lang="en-US" baseline="0" dirty="0" smtClean="0"/>
+          </a:p>
+          <a:p>
+            <a:r>
+              <a:rPr lang="en-US" dirty="0" smtClean="0"/>
+              <a:t>-XX:+UseG1GC</a:t>
             </a:r>
             <a:endParaRPr lang="en-US" dirty="0"/>
           </a:p>
@@ -1463,7 +1579,7 @@
           <a:p>
             <a:fld id="{F393B308-0126-7843-99E1-3134E661C2A1}" type="slidenum">
               <a:rPr lang="en-US" smtClean="0"/>
-              <a:t>16</a:t>
+              <a:t>14</a:t>
             </a:fld>
             <a:endParaRPr lang="en-US" dirty="0"/>
           </a:p>
@@ -1472,7 +1588,7 @@
     </p:spTree>
     <p:extLst>
       <p:ext uri="{BB962C8B-B14F-4D97-AF65-F5344CB8AC3E}">
-        <p14:creationId xmlns:p14="http://schemas.microsoft.com/office/powerpoint/2010/main" val="1041207117"/>
+        <p14:creationId xmlns:p14="http://schemas.microsoft.com/office/powerpoint/2010/main" val="87363976"/>
       </p:ext>
     </p:extLst>
   </p:cSld>
@@ -1670,7 +1786,7 @@
           <a:p>
             <a:fld id="{C8A432C8-69A7-458B-9684-2BFA64B31948}" type="datetime2">
               <a:rPr lang="en-US" smtClean="0"/>
-              <a:t>Monday, May 25, 15</a:t>
+              <a:t>Tuesday, May 26, 15</a:t>
             </a:fld>
             <a:endParaRPr lang="en-US" dirty="0"/>
           </a:p>
@@ -1872,7 +1988,7 @@
           <a:p>
             <a:fld id="{8CC057FC-95B6-4D89-AFDA-ABA33EE921E5}" type="datetime2">
               <a:rPr lang="en-US" smtClean="0"/>
-              <a:t>Monday, May 25, 15</a:t>
+              <a:t>Tuesday, May 26, 15</a:t>
             </a:fld>
             <a:endParaRPr lang="en-US" dirty="0"/>
           </a:p>
@@ -2049,7 +2165,7 @@
           <a:p>
             <a:fld id="{EC4549AC-EB31-477F-92A9-B1988E232878}" type="datetime2">
               <a:rPr lang="en-US" smtClean="0"/>
-              <a:t>Monday, May 25, 15</a:t>
+              <a:t>Tuesday, May 26, 15</a:t>
             </a:fld>
             <a:endParaRPr lang="en-US" dirty="0"/>
           </a:p>
@@ -2216,7 +2332,7 @@
           <a:p>
             <a:fld id="{6396A3A3-94A6-4E5B-AF39-173ACA3E61CC}" type="datetime2">
               <a:rPr lang="en-US" smtClean="0"/>
-              <a:t>Monday, May 25, 15</a:t>
+              <a:t>Tuesday, May 26, 15</a:t>
             </a:fld>
             <a:endParaRPr lang="en-US" dirty="0"/>
           </a:p>
@@ -2466,7 +2582,7 @@
           <a:p>
             <a:fld id="{9933D019-A32C-4EAD-B8E6-DBDA699692FD}" type="datetime2">
               <a:rPr lang="en-US" smtClean="0"/>
-              <a:t>Monday, May 25, 15</a:t>
+              <a:t>Tuesday, May 26, 15</a:t>
             </a:fld>
             <a:endParaRPr lang="en-US" dirty="0"/>
           </a:p>
@@ -2786,7 +2902,7 @@
           <a:p>
             <a:fld id="{CCEBA98F-560C-4997-81C4-81D4D9187EAB}" type="datetime2">
               <a:rPr lang="en-US" smtClean="0"/>
-              <a:t>Monday, May 25, 15</a:t>
+              <a:t>Tuesday, May 26, 15</a:t>
             </a:fld>
             <a:endParaRPr lang="en-US" dirty="0"/>
           </a:p>
@@ -3254,7 +3370,7 @@
           <a:p>
             <a:fld id="{150972B2-CA5C-437D-87D0-8081271A9E4B}" type="datetime2">
               <a:rPr lang="en-US" smtClean="0"/>
-              <a:t>Monday, May 25, 15</a:t>
+              <a:t>Tuesday, May 26, 15</a:t>
             </a:fld>
             <a:endParaRPr lang="en-US" dirty="0"/>
           </a:p>
@@ -3404,7 +3520,7 @@
           <a:p>
             <a:fld id="{79CD4847-11EF-4466-A8AD-85CDB7B49118}" type="datetime2">
               <a:rPr lang="en-US" smtClean="0"/>
-              <a:t>Monday, May 25, 15</a:t>
+              <a:t>Tuesday, May 26, 15</a:t>
             </a:fld>
             <a:endParaRPr lang="en-US" dirty="0"/>
           </a:p>
@@ -3496,7 +3612,7 @@
           <a:p>
             <a:fld id="{F168457A-3AB9-4880-8A0C-9F8524491207}" type="datetime2">
               <a:rPr lang="en-US" smtClean="0"/>
-              <a:t>Monday, May 25, 15</a:t>
+              <a:t>Tuesday, May 26, 15</a:t>
             </a:fld>
             <a:endParaRPr lang="en-US" dirty="0"/>
           </a:p>
@@ -3772,7 +3888,7 @@
           <a:p>
             <a:fld id="{3FE976D3-5B7F-4300-ABED-C91F1B2AE209}" type="datetime2">
               <a:rPr lang="en-US" smtClean="0"/>
-              <a:t>Monday, May 25, 15</a:t>
+              <a:t>Tuesday, May 26, 15</a:t>
             </a:fld>
             <a:endParaRPr lang="en-US" dirty="0"/>
           </a:p>
@@ -4079,7 +4195,7 @@
           <a:p>
             <a:fld id="{EBDC1E59-17DD-41CE-97CA-624A472382D4}" type="datetime2">
               <a:rPr lang="en-US" smtClean="0"/>
-              <a:t>Monday, May 25, 15</a:t>
+              <a:t>Tuesday, May 26, 15</a:t>
             </a:fld>
             <a:endParaRPr lang="en-US" dirty="0"/>
           </a:p>
@@ -4379,7 +4495,7 @@
           <a:p>
             <a:fld id="{A80CB818-7379-467D-8E76-EF9D9074A26C}" type="datetime2">
               <a:rPr lang="en-US" smtClean="0"/>
-              <a:t>Monday, May 25, 15</a:t>
+              <a:t>Tuesday, May 26, 15</a:t>
             </a:fld>
             <a:endParaRPr lang="en-US" dirty="0"/>
           </a:p>
@@ -5134,8 +5250,13 @@
             <a:pPr lvl="1"/>
             <a:r>
               <a:rPr lang="en-US" dirty="0" smtClean="0"/>
-              <a:t>Especially the kernel and caches!</a:t>
-            </a:r>
+              <a:t>Especially the kernel </a:t>
+            </a:r>
+            <a:r>
+              <a:rPr lang="en-US" dirty="0" smtClean="0"/>
+              <a:t>caches/buffers!</a:t>
+            </a:r>
+            <a:endParaRPr lang="en-US" dirty="0" smtClean="0"/>
           </a:p>
           <a:p>
             <a:r>
@@ -5214,7 +5335,12 @@
             <p:ph type="title"/>
           </p:nvPr>
         </p:nvSpPr>
-        <p:spPr/>
+        <p:spPr>
+          <a:xfrm>
+            <a:off x="457200" y="393700"/>
+            <a:ext cx="8229600" cy="990600"/>
+          </a:xfrm>
+        </p:spPr>
         <p:txBody>
           <a:bodyPr/>
           <a:lstStyle/>
@@ -5238,14 +5364,77 @@
           </p:nvPr>
         </p:nvPicPr>
         <p:blipFill>
-          <a:blip r:embed="rId2"/>
+          <a:blip r:embed="rId3"/>
           <a:srcRect t="3461" b="3461"/>
           <a:stretch>
             <a:fillRect/>
           </a:stretch>
         </p:blipFill>
-        <p:spPr/>
+        <p:spPr>
+          <a:xfrm>
+            <a:off x="457200" y="1257300"/>
+            <a:ext cx="8229600" cy="4876800"/>
+          </a:xfrm>
+        </p:spPr>
       </p:pic>
+      <p:sp>
+        <p:nvSpPr>
+          <p:cNvPr id="3" name="TextBox 2"/>
+          <p:cNvSpPr txBox="1"/>
+          <p:nvPr/>
+        </p:nvSpPr>
+        <p:spPr>
+          <a:xfrm>
+            <a:off x="114300" y="6254234"/>
+            <a:ext cx="9029700" cy="369332"/>
+          </a:xfrm>
+          <a:prstGeom prst="rect">
+            <a:avLst/>
+          </a:prstGeom>
+          <a:noFill/>
+        </p:spPr>
+        <p:txBody>
+          <a:bodyPr wrap="square" rtlCol="0">
+            <a:spAutoFit/>
+          </a:bodyPr>
+          <a:lstStyle/>
+          <a:p>
+            <a:r>
+              <a:rPr lang="en-US" dirty="0"/>
+              <a:t>http://</a:t>
+            </a:r>
+            <a:r>
+              <a:rPr lang="en-US" dirty="0" err="1"/>
+              <a:t>docs.oracle.com</a:t>
+            </a:r>
+            <a:r>
+              <a:rPr lang="en-US" dirty="0"/>
+              <a:t>/</a:t>
+            </a:r>
+            <a:r>
+              <a:rPr lang="en-US" dirty="0" err="1"/>
+              <a:t>javase</a:t>
+            </a:r>
+            <a:r>
+              <a:rPr lang="en-US" dirty="0"/>
+              <a:t>/6/docs/</a:t>
+            </a:r>
+            <a:r>
+              <a:rPr lang="en-US" dirty="0" err="1"/>
+              <a:t>technotes</a:t>
+            </a:r>
+            <a:r>
+              <a:rPr lang="en-US" dirty="0"/>
+              <a:t>/tools/share/</a:t>
+            </a:r>
+            <a:r>
+              <a:rPr lang="en-US" dirty="0" err="1"/>
+              <a:t>jstat.html#output_options</a:t>
+            </a:r>
+            <a:endParaRPr lang="en-US" dirty="0"/>
+          </a:p>
+        </p:txBody>
+      </p:sp>
     </p:spTree>
     <p:extLst>
       <p:ext uri="{BB962C8B-B14F-4D97-AF65-F5344CB8AC3E}">
@@ -6192,8 +6381,13 @@
             <a:pPr lvl="1"/>
             <a:r>
               <a:rPr lang="en-US" sz="1600" dirty="0" smtClean="0"/>
-              <a:t>Based on runtime type, client or server</a:t>
-            </a:r>
+              <a:t>Based on runtime type, client or </a:t>
+            </a:r>
+            <a:r>
+              <a:rPr lang="en-US" sz="1600" dirty="0" smtClean="0"/>
+              <a:t>server and on JVM version</a:t>
+            </a:r>
+            <a:endParaRPr lang="en-US" sz="1600" dirty="0" smtClean="0"/>
           </a:p>
           <a:p>
             <a:pPr marL="0" indent="0">
@@ -6333,7 +6527,15 @@
             <a:pPr lvl="1"/>
             <a:r>
               <a:rPr lang="en-US" dirty="0" smtClean="0"/>
-              <a:t>Major GC – happens very infrequently and this Eden, Old and Perm</a:t>
+              <a:t>Major GC – happens very infrequently and </a:t>
+            </a:r>
+            <a:r>
+              <a:rPr lang="en-US" dirty="0" smtClean="0"/>
+              <a:t>in Eden</a:t>
+            </a:r>
+            <a:r>
+              <a:rPr lang="en-US" dirty="0" smtClean="0"/>
+              <a:t>, Old and Perm</a:t>
             </a:r>
           </a:p>
           <a:p>

</xml_diff>

<commit_message>
tweak tools slide, added jstack
</commit_message>
<xml_diff>
--- a/java_operations/Lopsa Columbus - Operations view of the Java VM.pptx
+++ b/java_operations/Lopsa Columbus - Operations view of the Java VM.pptx
@@ -210,7 +210,7 @@
           <a:p>
             <a:fld id="{5B57975D-8600-6C44-8C2E-53A962C757AC}" type="datetimeFigureOut">
               <a:rPr lang="en-US" smtClean="0"/>
-              <a:t>5/26/15</a:t>
+              <a:t>5/27/15</a:t>
             </a:fld>
             <a:endParaRPr lang="en-US" dirty="0"/>
           </a:p>
@@ -1786,7 +1786,7 @@
           <a:p>
             <a:fld id="{C8A432C8-69A7-458B-9684-2BFA64B31948}" type="datetime2">
               <a:rPr lang="en-US" smtClean="0"/>
-              <a:t>Tuesday, May 26, 15</a:t>
+              <a:t>Wednesday, May 27, 15</a:t>
             </a:fld>
             <a:endParaRPr lang="en-US" dirty="0"/>
           </a:p>
@@ -1988,7 +1988,7 @@
           <a:p>
             <a:fld id="{8CC057FC-95B6-4D89-AFDA-ABA33EE921E5}" type="datetime2">
               <a:rPr lang="en-US" smtClean="0"/>
-              <a:t>Tuesday, May 26, 15</a:t>
+              <a:t>Wednesday, May 27, 15</a:t>
             </a:fld>
             <a:endParaRPr lang="en-US" dirty="0"/>
           </a:p>
@@ -2165,7 +2165,7 @@
           <a:p>
             <a:fld id="{EC4549AC-EB31-477F-92A9-B1988E232878}" type="datetime2">
               <a:rPr lang="en-US" smtClean="0"/>
-              <a:t>Tuesday, May 26, 15</a:t>
+              <a:t>Wednesday, May 27, 15</a:t>
             </a:fld>
             <a:endParaRPr lang="en-US" dirty="0"/>
           </a:p>
@@ -2332,7 +2332,7 @@
           <a:p>
             <a:fld id="{6396A3A3-94A6-4E5B-AF39-173ACA3E61CC}" type="datetime2">
               <a:rPr lang="en-US" smtClean="0"/>
-              <a:t>Tuesday, May 26, 15</a:t>
+              <a:t>Wednesday, May 27, 15</a:t>
             </a:fld>
             <a:endParaRPr lang="en-US" dirty="0"/>
           </a:p>
@@ -2582,7 +2582,7 @@
           <a:p>
             <a:fld id="{9933D019-A32C-4EAD-B8E6-DBDA699692FD}" type="datetime2">
               <a:rPr lang="en-US" smtClean="0"/>
-              <a:t>Tuesday, May 26, 15</a:t>
+              <a:t>Wednesday, May 27, 15</a:t>
             </a:fld>
             <a:endParaRPr lang="en-US" dirty="0"/>
           </a:p>
@@ -2902,7 +2902,7 @@
           <a:p>
             <a:fld id="{CCEBA98F-560C-4997-81C4-81D4D9187EAB}" type="datetime2">
               <a:rPr lang="en-US" smtClean="0"/>
-              <a:t>Tuesday, May 26, 15</a:t>
+              <a:t>Wednesday, May 27, 15</a:t>
             </a:fld>
             <a:endParaRPr lang="en-US" dirty="0"/>
           </a:p>
@@ -3370,7 +3370,7 @@
           <a:p>
             <a:fld id="{150972B2-CA5C-437D-87D0-8081271A9E4B}" type="datetime2">
               <a:rPr lang="en-US" smtClean="0"/>
-              <a:t>Tuesday, May 26, 15</a:t>
+              <a:t>Wednesday, May 27, 15</a:t>
             </a:fld>
             <a:endParaRPr lang="en-US" dirty="0"/>
           </a:p>
@@ -3520,7 +3520,7 @@
           <a:p>
             <a:fld id="{79CD4847-11EF-4466-A8AD-85CDB7B49118}" type="datetime2">
               <a:rPr lang="en-US" smtClean="0"/>
-              <a:t>Tuesday, May 26, 15</a:t>
+              <a:t>Wednesday, May 27, 15</a:t>
             </a:fld>
             <a:endParaRPr lang="en-US" dirty="0"/>
           </a:p>
@@ -3612,7 +3612,7 @@
           <a:p>
             <a:fld id="{F168457A-3AB9-4880-8A0C-9F8524491207}" type="datetime2">
               <a:rPr lang="en-US" smtClean="0"/>
-              <a:t>Tuesday, May 26, 15</a:t>
+              <a:t>Wednesday, May 27, 15</a:t>
             </a:fld>
             <a:endParaRPr lang="en-US" dirty="0"/>
           </a:p>
@@ -3888,7 +3888,7 @@
           <a:p>
             <a:fld id="{3FE976D3-5B7F-4300-ABED-C91F1B2AE209}" type="datetime2">
               <a:rPr lang="en-US" smtClean="0"/>
-              <a:t>Tuesday, May 26, 15</a:t>
+              <a:t>Wednesday, May 27, 15</a:t>
             </a:fld>
             <a:endParaRPr lang="en-US" dirty="0"/>
           </a:p>
@@ -4195,7 +4195,7 @@
           <a:p>
             <a:fld id="{EBDC1E59-17DD-41CE-97CA-624A472382D4}" type="datetime2">
               <a:rPr lang="en-US" smtClean="0"/>
-              <a:t>Tuesday, May 26, 15</a:t>
+              <a:t>Wednesday, May 27, 15</a:t>
             </a:fld>
             <a:endParaRPr lang="en-US" dirty="0"/>
           </a:p>
@@ -4495,7 +4495,7 @@
           <a:p>
             <a:fld id="{A80CB818-7379-467D-8E76-EF9D9074A26C}" type="datetime2">
               <a:rPr lang="en-US" smtClean="0"/>
-              <a:t>Tuesday, May 26, 15</a:t>
+              <a:t>Wednesday, May 27, 15</a:t>
             </a:fld>
             <a:endParaRPr lang="en-US" dirty="0"/>
           </a:p>
@@ -5250,13 +5250,8 @@
             <a:pPr lvl="1"/>
             <a:r>
               <a:rPr lang="en-US" dirty="0" smtClean="0"/>
-              <a:t>Especially the kernel </a:t>
-            </a:r>
-            <a:r>
-              <a:rPr lang="en-US" dirty="0" smtClean="0"/>
-              <a:t>caches/buffers!</a:t>
-            </a:r>
-            <a:endParaRPr lang="en-US" dirty="0" smtClean="0"/>
+              <a:t>Especially the kernel caches/buffers!</a:t>
+            </a:r>
           </a:p>
           <a:p>
             <a:r>
@@ -6381,13 +6376,8 @@
             <a:pPr lvl="1"/>
             <a:r>
               <a:rPr lang="en-US" sz="1600" dirty="0" smtClean="0"/>
-              <a:t>Based on runtime type, client or </a:t>
-            </a:r>
-            <a:r>
-              <a:rPr lang="en-US" sz="1600" dirty="0" smtClean="0"/>
-              <a:t>server and on JVM version</a:t>
-            </a:r>
-            <a:endParaRPr lang="en-US" sz="1600" dirty="0" smtClean="0"/>
+              <a:t>Based on runtime type, client or server and on JVM version</a:t>
+            </a:r>
           </a:p>
           <a:p>
             <a:pPr marL="0" indent="0">
@@ -6527,15 +6517,7 @@
             <a:pPr lvl="1"/>
             <a:r>
               <a:rPr lang="en-US" dirty="0" smtClean="0"/>
-              <a:t>Major GC – happens very infrequently and </a:t>
-            </a:r>
-            <a:r>
-              <a:rPr lang="en-US" dirty="0" smtClean="0"/>
-              <a:t>in Eden</a:t>
-            </a:r>
-            <a:r>
-              <a:rPr lang="en-US" dirty="0" smtClean="0"/>
-              <a:t>, Old and Perm</a:t>
+              <a:t>Major GC – happens very infrequently and in Eden, Old and Perm</a:t>
             </a:r>
           </a:p>
           <a:p>
@@ -7222,14 +7204,14 @@
             <p:ph idx="1"/>
             <p:extLst>
               <p:ext uri="{D42A27DB-BD31-4B8C-83A1-F6EECF244321}">
-                <p14:modId xmlns:p14="http://schemas.microsoft.com/office/powerpoint/2010/main" val="1502823669"/>
+                <p14:modId xmlns:p14="http://schemas.microsoft.com/office/powerpoint/2010/main" val="4164020783"/>
               </p:ext>
             </p:extLst>
           </p:nvPr>
         </p:nvGraphicFramePr>
         <p:xfrm>
           <a:off x="457200" y="1600200"/>
-          <a:ext cx="8229600" cy="2966720"/>
+          <a:ext cx="8229600" cy="3337560"/>
         </p:xfrm>
         <a:graphic>
           <a:graphicData uri="http://schemas.openxmlformats.org/drawingml/2006/table">
@@ -7384,6 +7366,36 @@
                         <a:rPr lang="en-US" dirty="0" smtClean="0"/>
                         <a:t>^^</a:t>
                       </a:r>
+                    </a:p>
+                  </a:txBody>
+                  <a:tcPr/>
+                </a:tc>
+              </a:tr>
+              <a:tr h="370840">
+                <a:tc>
+                  <a:txBody>
+                    <a:bodyPr/>
+                    <a:lstStyle/>
+                    <a:p>
+                      <a:r>
+                        <a:rPr lang="en-US" dirty="0" err="1" smtClean="0"/>
+                        <a:t>jstack</a:t>
+                      </a:r>
+                      <a:endParaRPr lang="en-US" dirty="0"/>
+                    </a:p>
+                  </a:txBody>
+                  <a:tcPr/>
+                </a:tc>
+                <a:tc>
+                  <a:txBody>
+                    <a:bodyPr/>
+                    <a:lstStyle/>
+                    <a:p>
+                      <a:r>
+                        <a:rPr lang="en-US" smtClean="0"/>
+                        <a:t>^^</a:t>
+                      </a:r>
+                      <a:endParaRPr lang="en-US" dirty="0"/>
                     </a:p>
                   </a:txBody>
                   <a:tcPr/>

</xml_diff>